<commit_message>
App 11 has been added
</commit_message>
<xml_diff>
--- a/Presentations/UI5_004.pptx
+++ b/Presentations/UI5_004.pptx
@@ -5,7 +5,7 @@
     <p:sldMasterId id="2147483660" r:id="rId1"/>
   </p:sldMasterIdLst>
   <p:notesMasterIdLst>
-    <p:notesMasterId r:id="rId7"/>
+    <p:notesMasterId r:id="rId9"/>
   </p:notesMasterIdLst>
   <p:sldIdLst>
     <p:sldId id="256" r:id="rId2"/>
@@ -13,6 +13,8 @@
     <p:sldId id="262" r:id="rId4"/>
     <p:sldId id="261" r:id="rId5"/>
     <p:sldId id="260" r:id="rId6"/>
+    <p:sldId id="263" r:id="rId7"/>
+    <p:sldId id="264" r:id="rId8"/>
   </p:sldIdLst>
   <p:sldSz cx="12192000" cy="6858000"/>
   <p:notesSz cx="6858000" cy="9144000"/>
@@ -615,20 +617,6 @@
                 <a:ea typeface="+mn-ea"/>
                 <a:cs typeface="+mn-cs"/>
               </a:rPr>
-              <a:t>Components are independent and reusable parts used in OpenUI5 applications.</a:t>
-            </a:r>
-          </a:p>
-          <a:p>
-            <a:r>
-              <a:rPr lang="en-GB" sz="1200" b="0" i="0" kern="1200" dirty="0">
-                <a:solidFill>
-                  <a:schemeClr val="tx1"/>
-                </a:solidFill>
-                <a:effectLst/>
-                <a:latin typeface="+mn-lt"/>
-                <a:ea typeface="+mn-ea"/>
-                <a:cs typeface="+mn-cs"/>
-              </a:rPr>
               <a:t>The</a:t>
             </a:r>
             <a:r>
@@ -773,6 +761,222 @@
     <p:extLst>
       <p:ext uri="{BB962C8B-B14F-4D97-AF65-F5344CB8AC3E}">
         <p14:creationId xmlns:p14="http://schemas.microsoft.com/office/powerpoint/2010/main" val="1360770666"/>
+      </p:ext>
+    </p:extLst>
+  </p:cSld>
+  <p:clrMapOvr>
+    <a:masterClrMapping/>
+  </p:clrMapOvr>
+</p:notes>
+</file>
+
+<file path=ppt/notesSlides/notesSlide3.xml><?xml version="1.0" encoding="utf-8"?>
+<p:notes xmlns:a="http://schemas.openxmlformats.org/drawingml/2006/main" xmlns:r="http://schemas.openxmlformats.org/officeDocument/2006/relationships" xmlns:p="http://schemas.openxmlformats.org/presentationml/2006/main">
+  <p:cSld>
+    <p:spTree>
+      <p:nvGrpSpPr>
+        <p:cNvPr id="1" name=""/>
+        <p:cNvGrpSpPr/>
+        <p:nvPr/>
+      </p:nvGrpSpPr>
+      <p:grpSpPr>
+        <a:xfrm>
+          <a:off x="0" y="0"/>
+          <a:ext cx="0" cy="0"/>
+          <a:chOff x="0" y="0"/>
+          <a:chExt cx="0" cy="0"/>
+        </a:xfrm>
+      </p:grpSpPr>
+      <p:sp>
+        <p:nvSpPr>
+          <p:cNvPr id="2" name="Slide Image Placeholder 1"/>
+          <p:cNvSpPr>
+            <a:spLocks noGrp="1" noRot="1" noChangeAspect="1"/>
+          </p:cNvSpPr>
+          <p:nvPr>
+            <p:ph type="sldImg"/>
+          </p:nvPr>
+        </p:nvSpPr>
+        <p:spPr/>
+      </p:sp>
+      <p:sp>
+        <p:nvSpPr>
+          <p:cNvPr id="3" name="Notes Placeholder 2"/>
+          <p:cNvSpPr>
+            <a:spLocks noGrp="1"/>
+          </p:cNvSpPr>
+          <p:nvPr>
+            <p:ph type="body" idx="1"/>
+          </p:nvPr>
+        </p:nvSpPr>
+        <p:spPr/>
+        <p:txBody>
+          <a:bodyPr/>
+          <a:lstStyle/>
+          <a:p>
+            <a:r>
+              <a:rPr lang="en-GB" sz="1200" b="0" i="0" kern="1200" dirty="0">
+                <a:solidFill>
+                  <a:schemeClr val="tx1"/>
+                </a:solidFill>
+                <a:effectLst/>
+                <a:latin typeface="+mn-lt"/>
+                <a:ea typeface="+mn-ea"/>
+                <a:cs typeface="+mn-cs"/>
+              </a:rPr>
+              <a:t>Components are independent and reusable parts used in OpenUI5 applications.</a:t>
+            </a:r>
+          </a:p>
+        </p:txBody>
+      </p:sp>
+      <p:sp>
+        <p:nvSpPr>
+          <p:cNvPr id="4" name="Slide Number Placeholder 3"/>
+          <p:cNvSpPr>
+            <a:spLocks noGrp="1"/>
+          </p:cNvSpPr>
+          <p:nvPr>
+            <p:ph type="sldNum" sz="quarter" idx="5"/>
+          </p:nvPr>
+        </p:nvSpPr>
+        <p:spPr/>
+        <p:txBody>
+          <a:bodyPr/>
+          <a:lstStyle/>
+          <a:p>
+            <a:fld id="{90011A40-B447-49DA-903F-40CA5AB620B1}" type="slidenum">
+              <a:rPr lang="en-US" smtClean="0"/>
+              <a:t>6</a:t>
+            </a:fld>
+            <a:endParaRPr lang="en-US"/>
+          </a:p>
+        </p:txBody>
+      </p:sp>
+    </p:spTree>
+    <p:extLst>
+      <p:ext uri="{BB962C8B-B14F-4D97-AF65-F5344CB8AC3E}">
+        <p14:creationId xmlns:p14="http://schemas.microsoft.com/office/powerpoint/2010/main" val="824717159"/>
+      </p:ext>
+    </p:extLst>
+  </p:cSld>
+  <p:clrMapOvr>
+    <a:masterClrMapping/>
+  </p:clrMapOvr>
+</p:notes>
+</file>
+
+<file path=ppt/notesSlides/notesSlide4.xml><?xml version="1.0" encoding="utf-8"?>
+<p:notes xmlns:a="http://schemas.openxmlformats.org/drawingml/2006/main" xmlns:r="http://schemas.openxmlformats.org/officeDocument/2006/relationships" xmlns:p="http://schemas.openxmlformats.org/presentationml/2006/main">
+  <p:cSld>
+    <p:spTree>
+      <p:nvGrpSpPr>
+        <p:cNvPr id="1" name=""/>
+        <p:cNvGrpSpPr/>
+        <p:nvPr/>
+      </p:nvGrpSpPr>
+      <p:grpSpPr>
+        <a:xfrm>
+          <a:off x="0" y="0"/>
+          <a:ext cx="0" cy="0"/>
+          <a:chOff x="0" y="0"/>
+          <a:chExt cx="0" cy="0"/>
+        </a:xfrm>
+      </p:grpSpPr>
+      <p:sp>
+        <p:nvSpPr>
+          <p:cNvPr id="2" name="Slide Image Placeholder 1"/>
+          <p:cNvSpPr>
+            <a:spLocks noGrp="1" noRot="1" noChangeAspect="1"/>
+          </p:cNvSpPr>
+          <p:nvPr>
+            <p:ph type="sldImg"/>
+          </p:nvPr>
+        </p:nvSpPr>
+        <p:spPr/>
+      </p:sp>
+      <p:sp>
+        <p:nvSpPr>
+          <p:cNvPr id="3" name="Notes Placeholder 2"/>
+          <p:cNvSpPr>
+            <a:spLocks noGrp="1"/>
+          </p:cNvSpPr>
+          <p:nvPr>
+            <p:ph type="body" idx="1"/>
+          </p:nvPr>
+        </p:nvSpPr>
+        <p:spPr/>
+        <p:txBody>
+          <a:bodyPr/>
+          <a:lstStyle/>
+          <a:p>
+            <a:r>
+              <a:rPr lang="en-GB" dirty="0"/>
+              <a:t>new Filter({ filters: </a:t>
+            </a:r>
+            <a:r>
+              <a:rPr lang="en-GB" dirty="0" err="1"/>
+              <a:t>aTableSearchState</a:t>
+            </a:r>
+            <a:r>
+              <a:rPr lang="en-GB" dirty="0"/>
+              <a:t>, and: false })</a:t>
+            </a:r>
+          </a:p>
+          <a:p>
+            <a:endParaRPr lang="en-GB" dirty="0"/>
+          </a:p>
+          <a:p>
+            <a:r>
+              <a:rPr lang="en-US" dirty="0">
+                <a:hlinkClick r:id="rId3"/>
+              </a:rPr>
+              <a:t>https://sapui5.hana.ondemand.com/#/api/sap.ui.model.ListBinding</a:t>
+            </a:r>
+            <a:endParaRPr lang="en-US" dirty="0">
+              <a:hlinkClick r:id="rId4"/>
+            </a:endParaRPr>
+          </a:p>
+          <a:p>
+            <a:r>
+              <a:rPr lang="en-US" dirty="0">
+                <a:hlinkClick r:id="rId4"/>
+              </a:rPr>
+              <a:t>https://sapui5.hana.ondemand.com/#/api/sap.ui.model.FilterType</a:t>
+            </a:r>
+            <a:endParaRPr lang="en-US" dirty="0"/>
+          </a:p>
+          <a:p>
+            <a:endParaRPr lang="en-US" dirty="0"/>
+          </a:p>
+        </p:txBody>
+      </p:sp>
+      <p:sp>
+        <p:nvSpPr>
+          <p:cNvPr id="4" name="Slide Number Placeholder 3"/>
+          <p:cNvSpPr>
+            <a:spLocks noGrp="1"/>
+          </p:cNvSpPr>
+          <p:nvPr>
+            <p:ph type="sldNum" sz="quarter" idx="5"/>
+          </p:nvPr>
+        </p:nvSpPr>
+        <p:spPr/>
+        <p:txBody>
+          <a:bodyPr/>
+          <a:lstStyle/>
+          <a:p>
+            <a:fld id="{90011A40-B447-49DA-903F-40CA5AB620B1}" type="slidenum">
+              <a:rPr lang="en-US" smtClean="0"/>
+              <a:t>7</a:t>
+            </a:fld>
+            <a:endParaRPr lang="en-US"/>
+          </a:p>
+        </p:txBody>
+      </p:sp>
+    </p:spTree>
+    <p:extLst>
+      <p:ext uri="{BB962C8B-B14F-4D97-AF65-F5344CB8AC3E}">
+        <p14:creationId xmlns:p14="http://schemas.microsoft.com/office/powerpoint/2010/main" val="2241139130"/>
       </p:ext>
     </p:extLst>
   </p:cSld>
@@ -13401,12 +13605,6 @@
               <a:t>Routing</a:t>
             </a:r>
           </a:p>
-          <a:p>
-            <a:r>
-              <a:rPr lang="en-US" dirty="0"/>
-              <a:t>Component.js</a:t>
-            </a:r>
-          </a:p>
         </p:txBody>
       </p:sp>
       <p:pic>
@@ -13490,6 +13688,547 @@
     <p:extLst>
       <p:ext uri="{BB962C8B-B14F-4D97-AF65-F5344CB8AC3E}">
         <p14:creationId xmlns:p14="http://schemas.microsoft.com/office/powerpoint/2010/main" val="2018279345"/>
+      </p:ext>
+    </p:extLst>
+  </p:cSld>
+  <p:clrMapOvr>
+    <a:masterClrMapping/>
+  </p:clrMapOvr>
+</p:sld>
+</file>
+
+<file path=ppt/slides/slide6.xml><?xml version="1.0" encoding="utf-8"?>
+<p:sld xmlns:a="http://schemas.openxmlformats.org/drawingml/2006/main" xmlns:r="http://schemas.openxmlformats.org/officeDocument/2006/relationships" xmlns:p="http://schemas.openxmlformats.org/presentationml/2006/main">
+  <p:cSld>
+    <p:spTree>
+      <p:nvGrpSpPr>
+        <p:cNvPr id="1" name=""/>
+        <p:cNvGrpSpPr/>
+        <p:nvPr/>
+      </p:nvGrpSpPr>
+      <p:grpSpPr>
+        <a:xfrm>
+          <a:off x="0" y="0"/>
+          <a:ext cx="0" cy="0"/>
+          <a:chOff x="0" y="0"/>
+          <a:chExt cx="0" cy="0"/>
+        </a:xfrm>
+      </p:grpSpPr>
+      <p:sp>
+        <p:nvSpPr>
+          <p:cNvPr id="4" name="Title 3">
+            <a:extLst>
+              <a:ext uri="{FF2B5EF4-FFF2-40B4-BE49-F238E27FC236}">
+                <a16:creationId xmlns:a16="http://schemas.microsoft.com/office/drawing/2014/main" id="{AB99A3A9-1BA5-4EAD-9B6F-495023820A50}"/>
+              </a:ext>
+            </a:extLst>
+          </p:cNvPr>
+          <p:cNvSpPr>
+            <a:spLocks noGrp="1"/>
+          </p:cNvSpPr>
+          <p:nvPr>
+            <p:ph type="title"/>
+          </p:nvPr>
+        </p:nvSpPr>
+        <p:spPr>
+          <a:xfrm>
+            <a:off x="152399" y="-82743"/>
+            <a:ext cx="9800493" cy="1325563"/>
+          </a:xfrm>
+        </p:spPr>
+        <p:txBody>
+          <a:bodyPr/>
+          <a:lstStyle/>
+          <a:p>
+            <a:r>
+              <a:rPr lang="en-US" dirty="0"/>
+              <a:t>App#11: List of Products</a:t>
+            </a:r>
+          </a:p>
+        </p:txBody>
+      </p:sp>
+      <p:sp>
+        <p:nvSpPr>
+          <p:cNvPr id="2" name="Text Placeholder 1">
+            <a:extLst>
+              <a:ext uri="{FF2B5EF4-FFF2-40B4-BE49-F238E27FC236}">
+                <a16:creationId xmlns:a16="http://schemas.microsoft.com/office/drawing/2014/main" id="{AB981738-845F-49A4-941E-581364438677}"/>
+              </a:ext>
+            </a:extLst>
+          </p:cNvPr>
+          <p:cNvSpPr>
+            <a:spLocks noGrp="1"/>
+          </p:cNvSpPr>
+          <p:nvPr>
+            <p:ph type="body" idx="1"/>
+          </p:nvPr>
+        </p:nvSpPr>
+        <p:spPr>
+          <a:xfrm>
+            <a:off x="152394" y="1023179"/>
+            <a:ext cx="5548609" cy="5596282"/>
+          </a:xfrm>
+        </p:spPr>
+        <p:txBody>
+          <a:bodyPr>
+            <a:normAutofit lnSpcReduction="10000"/>
+          </a:bodyPr>
+          <a:lstStyle/>
+          <a:p>
+            <a:r>
+              <a:rPr lang="en-US" dirty="0"/>
+              <a:t>Component.js &amp; Fiori</a:t>
+            </a:r>
+          </a:p>
+          <a:p>
+            <a:r>
+              <a:rPr lang="en-US" dirty="0" err="1"/>
+              <a:t>sapUiTinyMargin</a:t>
+            </a:r>
+            <a:r>
+              <a:rPr lang="en-US" dirty="0"/>
+              <a:t> (8px)</a:t>
+            </a:r>
+          </a:p>
+          <a:p>
+            <a:pPr lvl="1" fontAlgn="base">
+              <a:buFont typeface="Wingdings" panose="05000000000000000000" pitchFamily="2" charset="2"/>
+              <a:buChar char="§"/>
+            </a:pPr>
+            <a:r>
+              <a:rPr lang="en-US" sz="1800" dirty="0" err="1"/>
+              <a:t>sapUiTinyMarginTop</a:t>
+            </a:r>
+            <a:r>
+              <a:rPr lang="en-US" sz="1800" dirty="0"/>
+              <a:t> </a:t>
+            </a:r>
+          </a:p>
+          <a:p>
+            <a:pPr lvl="1" fontAlgn="base">
+              <a:buFont typeface="Wingdings" panose="05000000000000000000" pitchFamily="2" charset="2"/>
+              <a:buChar char="§"/>
+            </a:pPr>
+            <a:r>
+              <a:rPr lang="en-US" sz="1800" dirty="0" err="1"/>
+              <a:t>sapUiTinyMarginBottom</a:t>
+            </a:r>
+            <a:endParaRPr lang="en-US" sz="1800" dirty="0"/>
+          </a:p>
+          <a:p>
+            <a:pPr lvl="1" fontAlgn="base">
+              <a:buFont typeface="Wingdings" panose="05000000000000000000" pitchFamily="2" charset="2"/>
+              <a:buChar char="§"/>
+            </a:pPr>
+            <a:r>
+              <a:rPr lang="en-US" sz="1800" dirty="0" err="1"/>
+              <a:t>sapUiTinyMarginBegin</a:t>
+            </a:r>
+            <a:endParaRPr lang="en-US" sz="1800" dirty="0"/>
+          </a:p>
+          <a:p>
+            <a:pPr lvl="1" fontAlgn="base">
+              <a:buFont typeface="Wingdings" panose="05000000000000000000" pitchFamily="2" charset="2"/>
+              <a:buChar char="§"/>
+            </a:pPr>
+            <a:r>
+              <a:rPr lang="en-US" sz="1800" dirty="0" err="1"/>
+              <a:t>sapUiTinyMarginEnd</a:t>
+            </a:r>
+            <a:endParaRPr lang="en-US" sz="1800" dirty="0"/>
+          </a:p>
+          <a:p>
+            <a:pPr lvl="1">
+              <a:buFont typeface="Wingdings" panose="05000000000000000000" pitchFamily="2" charset="2"/>
+              <a:buChar char="§"/>
+            </a:pPr>
+            <a:r>
+              <a:rPr lang="en-US" sz="1800" dirty="0" err="1"/>
+              <a:t>sapUiTinyMarginBeginEnd</a:t>
+            </a:r>
+            <a:endParaRPr lang="en-US" sz="1800" dirty="0"/>
+          </a:p>
+          <a:p>
+            <a:pPr lvl="1">
+              <a:buFont typeface="Wingdings" panose="05000000000000000000" pitchFamily="2" charset="2"/>
+              <a:buChar char="§"/>
+            </a:pPr>
+            <a:r>
+              <a:rPr lang="en-US" sz="1800" dirty="0" err="1"/>
+              <a:t>sapUiTinyMarginTopBottom</a:t>
+            </a:r>
+            <a:endParaRPr lang="en-US" sz="1800" dirty="0"/>
+          </a:p>
+          <a:p>
+            <a:pPr lvl="1">
+              <a:buFont typeface="Wingdings" panose="05000000000000000000" pitchFamily="2" charset="2"/>
+              <a:buChar char="§"/>
+            </a:pPr>
+            <a:r>
+              <a:rPr lang="en-US" sz="1800" dirty="0">
+                <a:solidFill>
+                  <a:schemeClr val="accent1">
+                    <a:lumMod val="60000"/>
+                    <a:lumOff val="40000"/>
+                  </a:schemeClr>
+                </a:solidFill>
+              </a:rPr>
+              <a:t>Small (16px), Medium (32px), Large (64px) </a:t>
+            </a:r>
+          </a:p>
+          <a:p>
+            <a:pPr>
+              <a:buFont typeface="Arial" panose="020B0604020202020204" pitchFamily="34" charset="0"/>
+              <a:buChar char="•"/>
+            </a:pPr>
+            <a:r>
+              <a:rPr lang="en-US" dirty="0" err="1"/>
+              <a:t>sapUiNoMargin</a:t>
+            </a:r>
+            <a:endParaRPr lang="en-US" dirty="0"/>
+          </a:p>
+          <a:p>
+            <a:pPr>
+              <a:buFont typeface="Arial" panose="020B0604020202020204" pitchFamily="34" charset="0"/>
+              <a:buChar char="•"/>
+            </a:pPr>
+            <a:r>
+              <a:rPr lang="en-US" dirty="0" err="1"/>
+              <a:t>sapUiResponsiveMargin</a:t>
+            </a:r>
+            <a:endParaRPr lang="en-US" dirty="0"/>
+          </a:p>
+          <a:p>
+            <a:r>
+              <a:rPr lang="en-US" dirty="0" err="1"/>
+              <a:t>sapUiNoContentPadding</a:t>
+            </a:r>
+            <a:endParaRPr lang="en-US" dirty="0"/>
+          </a:p>
+          <a:p>
+            <a:r>
+              <a:rPr lang="en-US" dirty="0" err="1"/>
+              <a:t>sapUiContentPadding</a:t>
+            </a:r>
+            <a:endParaRPr lang="en-US" dirty="0"/>
+          </a:p>
+          <a:p>
+            <a:r>
+              <a:rPr lang="en-US" dirty="0" err="1"/>
+              <a:t>sapUiResponsiveContentPadding</a:t>
+            </a:r>
+            <a:endParaRPr lang="en-US" dirty="0"/>
+          </a:p>
+          <a:p>
+            <a:pPr>
+              <a:buFont typeface="Arial" panose="020B0604020202020204" pitchFamily="34" charset="0"/>
+              <a:buChar char="•"/>
+            </a:pPr>
+            <a:endParaRPr lang="en-US" sz="2400" dirty="0"/>
+          </a:p>
+          <a:p>
+            <a:pPr>
+              <a:buFont typeface="Wingdings" panose="05000000000000000000" pitchFamily="2" charset="2"/>
+              <a:buChar char="§"/>
+            </a:pPr>
+            <a:endParaRPr lang="en-US" sz="2200" dirty="0">
+              <a:solidFill>
+                <a:schemeClr val="accent1">
+                  <a:lumMod val="60000"/>
+                  <a:lumOff val="40000"/>
+                </a:schemeClr>
+              </a:solidFill>
+            </a:endParaRPr>
+          </a:p>
+          <a:p>
+            <a:pPr lvl="1">
+              <a:buFont typeface="Wingdings" panose="05000000000000000000" pitchFamily="2" charset="2"/>
+              <a:buChar char="§"/>
+            </a:pPr>
+            <a:endParaRPr lang="en-US" sz="1800" dirty="0"/>
+          </a:p>
+          <a:p>
+            <a:endParaRPr lang="en-US" dirty="0"/>
+          </a:p>
+        </p:txBody>
+      </p:sp>
+      <p:pic>
+        <p:nvPicPr>
+          <p:cNvPr id="9" name="Picture 8" descr="A screen shot of a computer&#10;&#10;Description automatically generated">
+            <a:extLst>
+              <a:ext uri="{FF2B5EF4-FFF2-40B4-BE49-F238E27FC236}">
+                <a16:creationId xmlns:a16="http://schemas.microsoft.com/office/drawing/2014/main" id="{B3FB3061-B2EC-4AD2-8DA4-7973E33476BC}"/>
+              </a:ext>
+            </a:extLst>
+          </p:cNvPr>
+          <p:cNvPicPr>
+            <a:picLocks noChangeAspect="1"/>
+          </p:cNvPicPr>
+          <p:nvPr/>
+        </p:nvPicPr>
+        <p:blipFill>
+          <a:blip r:embed="rId3">
+            <a:extLst>
+              <a:ext uri="{28A0092B-C50C-407E-A947-70E740481C1C}">
+                <a14:useLocalDpi xmlns:a14="http://schemas.microsoft.com/office/drawing/2010/main" val="0"/>
+              </a:ext>
+            </a:extLst>
+          </a:blip>
+          <a:stretch>
+            <a:fillRect/>
+          </a:stretch>
+        </p:blipFill>
+        <p:spPr>
+          <a:xfrm>
+            <a:off x="5703251" y="784915"/>
+            <a:ext cx="4249641" cy="6072809"/>
+          </a:xfrm>
+          <a:prstGeom prst="rect">
+            <a:avLst/>
+          </a:prstGeom>
+        </p:spPr>
+      </p:pic>
+    </p:spTree>
+    <p:extLst>
+      <p:ext uri="{BB962C8B-B14F-4D97-AF65-F5344CB8AC3E}">
+        <p14:creationId xmlns:p14="http://schemas.microsoft.com/office/powerpoint/2010/main" val="2712491222"/>
+      </p:ext>
+    </p:extLst>
+  </p:cSld>
+  <p:clrMapOvr>
+    <a:masterClrMapping/>
+  </p:clrMapOvr>
+</p:sld>
+</file>
+
+<file path=ppt/slides/slide7.xml><?xml version="1.0" encoding="utf-8"?>
+<p:sld xmlns:a="http://schemas.openxmlformats.org/drawingml/2006/main" xmlns:r="http://schemas.openxmlformats.org/officeDocument/2006/relationships" xmlns:p="http://schemas.openxmlformats.org/presentationml/2006/main">
+  <p:cSld>
+    <p:spTree>
+      <p:nvGrpSpPr>
+        <p:cNvPr id="1" name=""/>
+        <p:cNvGrpSpPr/>
+        <p:nvPr/>
+      </p:nvGrpSpPr>
+      <p:grpSpPr>
+        <a:xfrm>
+          <a:off x="0" y="0"/>
+          <a:ext cx="0" cy="0"/>
+          <a:chOff x="0" y="0"/>
+          <a:chExt cx="0" cy="0"/>
+        </a:xfrm>
+      </p:grpSpPr>
+      <p:sp>
+        <p:nvSpPr>
+          <p:cNvPr id="4" name="Title 3">
+            <a:extLst>
+              <a:ext uri="{FF2B5EF4-FFF2-40B4-BE49-F238E27FC236}">
+                <a16:creationId xmlns:a16="http://schemas.microsoft.com/office/drawing/2014/main" id="{AB99A3A9-1BA5-4EAD-9B6F-495023820A50}"/>
+              </a:ext>
+            </a:extLst>
+          </p:cNvPr>
+          <p:cNvSpPr>
+            <a:spLocks noGrp="1"/>
+          </p:cNvSpPr>
+          <p:nvPr>
+            <p:ph type="title"/>
+          </p:nvPr>
+        </p:nvSpPr>
+        <p:spPr>
+          <a:xfrm>
+            <a:off x="152399" y="-82743"/>
+            <a:ext cx="9800493" cy="1325563"/>
+          </a:xfrm>
+        </p:spPr>
+        <p:txBody>
+          <a:bodyPr/>
+          <a:lstStyle/>
+          <a:p>
+            <a:r>
+              <a:rPr lang="en-US" dirty="0"/>
+              <a:t>App#11: List of Products</a:t>
+            </a:r>
+          </a:p>
+        </p:txBody>
+      </p:sp>
+      <p:sp>
+        <p:nvSpPr>
+          <p:cNvPr id="2" name="Text Placeholder 1">
+            <a:extLst>
+              <a:ext uri="{FF2B5EF4-FFF2-40B4-BE49-F238E27FC236}">
+                <a16:creationId xmlns:a16="http://schemas.microsoft.com/office/drawing/2014/main" id="{AB981738-845F-49A4-941E-581364438677}"/>
+              </a:ext>
+            </a:extLst>
+          </p:cNvPr>
+          <p:cNvSpPr>
+            <a:spLocks noGrp="1"/>
+          </p:cNvSpPr>
+          <p:nvPr>
+            <p:ph type="body" idx="1"/>
+          </p:nvPr>
+        </p:nvSpPr>
+        <p:spPr>
+          <a:xfrm>
+            <a:off x="152394" y="1023179"/>
+            <a:ext cx="5548609" cy="5596282"/>
+          </a:xfrm>
+        </p:spPr>
+        <p:txBody>
+          <a:bodyPr>
+            <a:normAutofit/>
+          </a:bodyPr>
+          <a:lstStyle/>
+          <a:p>
+            <a:r>
+              <a:rPr lang="en-US" dirty="0"/>
+              <a:t>Sort &amp; Group</a:t>
+            </a:r>
+          </a:p>
+          <a:p>
+            <a:r>
+              <a:rPr lang="en-US" dirty="0">
+                <a:hlinkClick r:id="rId3"/>
+              </a:rPr>
+              <a:t>Filter</a:t>
+            </a:r>
+            <a:endParaRPr lang="en-US" dirty="0"/>
+          </a:p>
+          <a:p>
+            <a:r>
+              <a:rPr lang="en-US" dirty="0"/>
+              <a:t>Variables in i18n strings</a:t>
+            </a:r>
+          </a:p>
+          <a:p>
+            <a:r>
+              <a:rPr lang="en-US" dirty="0" err="1"/>
+              <a:t>SemanticPage</a:t>
+            </a:r>
+            <a:endParaRPr lang="en-US" dirty="0"/>
+          </a:p>
+          <a:p>
+            <a:r>
+              <a:rPr lang="en-US" dirty="0" err="1"/>
+              <a:t>footerCustomActions</a:t>
+            </a:r>
+            <a:endParaRPr lang="en-US" dirty="0"/>
+          </a:p>
+          <a:p>
+            <a:r>
+              <a:rPr lang="en-US" dirty="0" err="1"/>
+              <a:t>sap.ui.layout</a:t>
+            </a:r>
+            <a:endParaRPr lang="en-US" dirty="0"/>
+          </a:p>
+          <a:p>
+            <a:pPr>
+              <a:buFont typeface="Arial" panose="020B0604020202020204" pitchFamily="34" charset="0"/>
+              <a:buChar char="•"/>
+            </a:pPr>
+            <a:endParaRPr lang="en-US" sz="2400" dirty="0"/>
+          </a:p>
+          <a:p>
+            <a:pPr>
+              <a:buFont typeface="Wingdings" panose="05000000000000000000" pitchFamily="2" charset="2"/>
+              <a:buChar char="§"/>
+            </a:pPr>
+            <a:endParaRPr lang="en-US" sz="2200" dirty="0">
+              <a:solidFill>
+                <a:schemeClr val="accent1">
+                  <a:lumMod val="60000"/>
+                  <a:lumOff val="40000"/>
+                </a:schemeClr>
+              </a:solidFill>
+            </a:endParaRPr>
+          </a:p>
+          <a:p>
+            <a:pPr lvl="1">
+              <a:buFont typeface="Wingdings" panose="05000000000000000000" pitchFamily="2" charset="2"/>
+              <a:buChar char="§"/>
+            </a:pPr>
+            <a:endParaRPr lang="en-US" sz="1800" dirty="0"/>
+          </a:p>
+          <a:p>
+            <a:endParaRPr lang="en-US" dirty="0"/>
+          </a:p>
+        </p:txBody>
+      </p:sp>
+      <p:pic>
+        <p:nvPicPr>
+          <p:cNvPr id="5" name="Picture 4" descr="A screenshot of a computer&#10;&#10;Description automatically generated">
+            <a:extLst>
+              <a:ext uri="{FF2B5EF4-FFF2-40B4-BE49-F238E27FC236}">
+                <a16:creationId xmlns:a16="http://schemas.microsoft.com/office/drawing/2014/main" id="{E6E20610-2462-484C-8622-0FA856D2A75C}"/>
+              </a:ext>
+            </a:extLst>
+          </p:cNvPr>
+          <p:cNvPicPr>
+            <a:picLocks noChangeAspect="1"/>
+          </p:cNvPicPr>
+          <p:nvPr/>
+        </p:nvPicPr>
+        <p:blipFill>
+          <a:blip r:embed="rId4">
+            <a:extLst>
+              <a:ext uri="{28A0092B-C50C-407E-A947-70E740481C1C}">
+                <a14:useLocalDpi xmlns:a14="http://schemas.microsoft.com/office/drawing/2010/main" val="0"/>
+              </a:ext>
+            </a:extLst>
+          </a:blip>
+          <a:stretch>
+            <a:fillRect/>
+          </a:stretch>
+        </p:blipFill>
+        <p:spPr>
+          <a:xfrm>
+            <a:off x="5706902" y="799824"/>
+            <a:ext cx="4236051" cy="6042991"/>
+          </a:xfrm>
+          <a:prstGeom prst="rect">
+            <a:avLst/>
+          </a:prstGeom>
+        </p:spPr>
+      </p:pic>
+      <p:pic>
+        <p:nvPicPr>
+          <p:cNvPr id="7" name="Picture 6" descr="A screenshot of a cell phone&#10;&#10;Description automatically generated">
+            <a:extLst>
+              <a:ext uri="{FF2B5EF4-FFF2-40B4-BE49-F238E27FC236}">
+                <a16:creationId xmlns:a16="http://schemas.microsoft.com/office/drawing/2014/main" id="{98E49E86-749C-4086-A9BC-F7F013956C66}"/>
+              </a:ext>
+            </a:extLst>
+          </p:cNvPr>
+          <p:cNvPicPr>
+            <a:picLocks noChangeAspect="1"/>
+          </p:cNvPicPr>
+          <p:nvPr/>
+        </p:nvPicPr>
+        <p:blipFill>
+          <a:blip r:embed="rId5">
+            <a:extLst>
+              <a:ext uri="{28A0092B-C50C-407E-A947-70E740481C1C}">
+                <a14:useLocalDpi xmlns:a14="http://schemas.microsoft.com/office/drawing/2010/main" val="0"/>
+              </a:ext>
+            </a:extLst>
+          </a:blip>
+          <a:stretch>
+            <a:fillRect/>
+          </a:stretch>
+        </p:blipFill>
+        <p:spPr>
+          <a:xfrm>
+            <a:off x="1036315" y="4184595"/>
+            <a:ext cx="3786672" cy="2658220"/>
+          </a:xfrm>
+          <a:prstGeom prst="rect">
+            <a:avLst/>
+          </a:prstGeom>
+        </p:spPr>
+      </p:pic>
+    </p:spTree>
+    <p:extLst>
+      <p:ext uri="{BB962C8B-B14F-4D97-AF65-F5344CB8AC3E}">
+        <p14:creationId xmlns:p14="http://schemas.microsoft.com/office/powerpoint/2010/main" val="616943080"/>
       </p:ext>
     </p:extLst>
   </p:cSld>

</xml_diff>

<commit_message>
start of app 12
</commit_message>
<xml_diff>
--- a/Presentations/UI5_004.pptx
+++ b/Presentations/UI5_004.pptx
@@ -203,7 +203,7 @@
           <a:p>
             <a:fld id="{75F5B6A6-A5EC-474C-9974-408E57F2AD69}" type="datetimeFigureOut">
               <a:rPr lang="en-US" smtClean="0"/>
-              <a:t>2019-09-16</a:t>
+              <a:t>2019-09-17</a:t>
             </a:fld>
             <a:endParaRPr lang="en-US"/>
           </a:p>
@@ -825,6 +825,31 @@
                 <a:cs typeface="+mn-cs"/>
               </a:rPr>
               <a:t>Components are independent and reusable parts used in OpenUI5 applications.</a:t>
+            </a:r>
+          </a:p>
+          <a:p>
+            <a:endParaRPr lang="en-GB" sz="1200" b="0" i="0" kern="1200" dirty="0">
+              <a:solidFill>
+                <a:schemeClr val="tx1"/>
+              </a:solidFill>
+              <a:effectLst/>
+              <a:latin typeface="+mn-lt"/>
+              <a:ea typeface="+mn-ea"/>
+              <a:cs typeface="+mn-cs"/>
+            </a:endParaRPr>
+          </a:p>
+          <a:p>
+            <a:r>
+              <a:rPr lang="en-GB" sz="1200" b="0" i="0" kern="1200" dirty="0">
+                <a:solidFill>
+                  <a:schemeClr val="tx1"/>
+                </a:solidFill>
+                <a:effectLst/>
+                <a:latin typeface="+mn-lt"/>
+                <a:ea typeface="+mn-ea"/>
+                <a:cs typeface="+mn-cs"/>
+              </a:rPr>
+              <a:t>A shell control as container for our app and use it as our new root element. The shell takes care of visual adaptation of the application to the device’s screen size by introducing a so-called letterbox on desktop screens.</a:t>
             </a:r>
           </a:p>
         </p:txBody>
@@ -13515,8 +13540,12 @@
           <a:lstStyle/>
           <a:p>
             <a:r>
+              <a:rPr lang="en-US"/>
+              <a:t>Worklist </a:t>
+            </a:r>
+            <a:r>
               <a:rPr lang="en-US" dirty="0"/>
-              <a:t>Master-Details Template</a:t>
+              <a:t>Template</a:t>
             </a:r>
           </a:p>
           <a:p>

</xml_diff>